<commit_message>
small fix to fig
</commit_message>
<xml_diff>
--- a/figures/access.pptx
+++ b/figures/access.pptx
@@ -6458,7 +6458,7 @@
           <p:cNvPr id="17" name="Picture 16" descr="cloud_flat-with-edge.png">
             <a:extLst>
               <a:ext uri="{FF2B5EF4-FFF2-40B4-BE49-F238E27FC236}">
-                <a16:creationId xmlns="" xmlns:a16="http://schemas.microsoft.com/office/drawing/2014/main" id="{ADBDA620-F959-544B-A5E7-5E0D76D01353}"/>
+                <a16:creationId xmlns:a16="http://schemas.microsoft.com/office/drawing/2014/main" xmlns="" id="{ADBDA620-F959-544B-A5E7-5E0D76D01353}"/>
               </a:ext>
             </a:extLst>
           </p:cNvPr>
@@ -6514,7 +6514,7 @@
           <p:cNvPr id="18" name="Picture 17" descr="cloud_flat-with-edge.png">
             <a:extLst>
               <a:ext uri="{FF2B5EF4-FFF2-40B4-BE49-F238E27FC236}">
-                <a16:creationId xmlns="" xmlns:a16="http://schemas.microsoft.com/office/drawing/2014/main" id="{874B3795-E440-354A-A4F6-A596A13FECBD}"/>
+                <a16:creationId xmlns:a16="http://schemas.microsoft.com/office/drawing/2014/main" xmlns="" id="{874B3795-E440-354A-A4F6-A596A13FECBD}"/>
               </a:ext>
             </a:extLst>
           </p:cNvPr>
@@ -6570,7 +6570,7 @@
           <p:cNvPr id="19" name="Picture 18" descr="cloud_flat-with-edge.png">
             <a:extLst>
               <a:ext uri="{FF2B5EF4-FFF2-40B4-BE49-F238E27FC236}">
-                <a16:creationId xmlns="" xmlns:a16="http://schemas.microsoft.com/office/drawing/2014/main" id="{26F1F487-9A81-6145-BC36-A6432A0D0567}"/>
+                <a16:creationId xmlns:a16="http://schemas.microsoft.com/office/drawing/2014/main" xmlns="" id="{26F1F487-9A81-6145-BC36-A6432A0D0567}"/>
               </a:ext>
             </a:extLst>
           </p:cNvPr>
@@ -6626,7 +6626,7 @@
           <p:cNvPr id="20" name="Picture 19" descr="cloud_flat-with-edge.png">
             <a:extLst>
               <a:ext uri="{FF2B5EF4-FFF2-40B4-BE49-F238E27FC236}">
-                <a16:creationId xmlns="" xmlns:a16="http://schemas.microsoft.com/office/drawing/2014/main" id="{7706B9CE-246E-364A-B43A-D12AB2BF6758}"/>
+                <a16:creationId xmlns:a16="http://schemas.microsoft.com/office/drawing/2014/main" xmlns="" id="{7706B9CE-246E-364A-B43A-D12AB2BF6758}"/>
               </a:ext>
             </a:extLst>
           </p:cNvPr>
@@ -6759,7 +6759,7 @@
         </p:nvSpPr>
         <p:spPr>
           <a:xfrm flipH="1">
-            <a:off x="2958157" y="5280204"/>
+            <a:off x="2943409" y="5280204"/>
             <a:ext cx="1081899" cy="535531"/>
           </a:xfrm>
           <a:prstGeom prst="rect">
@@ -6780,11 +6780,7 @@
             </a:pPr>
             <a:r>
               <a:rPr lang="en-US" dirty="0" smtClean="0"/>
-              <a:t>Ac</a:t>
-            </a:r>
-            <a:r>
-              <a:rPr lang="en-US" dirty="0" smtClean="0"/>
-              <a:t>cess</a:t>
+              <a:t>Access</a:t>
             </a:r>
           </a:p>
           <a:p>
@@ -6798,6 +6794,36 @@
               <a:t>Networks</a:t>
             </a:r>
             <a:endParaRPr lang="en-US" dirty="0"/>
+          </a:p>
+        </p:txBody>
+      </p:sp>
+      <p:sp>
+        <p:nvSpPr>
+          <p:cNvPr id="3" name="TextBox 2"/>
+          <p:cNvSpPr txBox="1"/>
+          <p:nvPr/>
+        </p:nvSpPr>
+        <p:spPr>
+          <a:xfrm>
+            <a:off x="3861435" y="5296770"/>
+            <a:ext cx="1320041" cy="369332"/>
+          </a:xfrm>
+          <a:prstGeom prst="rect">
+            <a:avLst/>
+          </a:prstGeom>
+          <a:noFill/>
+        </p:spPr>
+        <p:txBody>
+          <a:bodyPr wrap="none" rtlCol="0">
+            <a:spAutoFit/>
+          </a:bodyPr>
+          <a:lstStyle/>
+          <a:p>
+            <a:r>
+              <a:rPr lang="en-US" smtClean="0"/>
+              <a:t>(e.g., CORD)</a:t>
+            </a:r>
+            <a:endParaRPr lang="en-US"/>
           </a:p>
         </p:txBody>
       </p:sp>

</xml_diff>